<commit_message>
Added more HW 2 info
</commit_message>
<xml_diff>
--- a/Unit02/Chad_Madding_Unit 2 For Live Session.pptx
+++ b/Unit02/Chad_Madding_Unit 2 For Live Session.pptx
@@ -7,7 +7,8 @@
   <p:sldIdLst>
     <p:sldId id="256" r:id="rId2"/>
     <p:sldId id="401" r:id="rId3"/>
-    <p:sldId id="400" r:id="rId4"/>
+    <p:sldId id="402" r:id="rId4"/>
+    <p:sldId id="400" r:id="rId5"/>
   </p:sldIdLst>
   <p:sldSz cx="9144000" cy="6858000" type="screen4x3"/>
   <p:notesSz cx="9144000" cy="6858000"/>
@@ -270,7 +271,7 @@
           <a:p>
             <a:fld id="{1D8BD707-D9CF-40AE-B4C6-C98DA3205C09}" type="datetimeFigureOut">
               <a:rPr lang="en-US"/>
-              <a:t>1/9/2020</a:t>
+              <a:t>1/10/2020</a:t>
             </a:fld>
             <a:endParaRPr lang="en-US"/>
           </a:p>
@@ -447,7 +448,7 @@
           <a:p>
             <a:fld id="{1D8BD707-D9CF-40AE-B4C6-C98DA3205C09}" type="datetimeFigureOut">
               <a:rPr lang="en-US"/>
-              <a:t>1/9/2020</a:t>
+              <a:t>1/10/2020</a:t>
             </a:fld>
             <a:endParaRPr lang="en-US"/>
           </a:p>
@@ -661,7 +662,7 @@
           <a:p>
             <a:fld id="{1D8BD707-D9CF-40AE-B4C6-C98DA3205C09}" type="datetimeFigureOut">
               <a:rPr lang="en-US"/>
-              <a:t>1/9/2020</a:t>
+              <a:t>1/10/2020</a:t>
             </a:fld>
             <a:endParaRPr lang="en-US"/>
           </a:p>
@@ -809,7 +810,7 @@
           <a:p>
             <a:fld id="{1D8BD707-D9CF-40AE-B4C6-C98DA3205C09}" type="datetimeFigureOut">
               <a:rPr lang="en-US"/>
-              <a:t>1/9/2020</a:t>
+              <a:t>1/10/2020</a:t>
             </a:fld>
             <a:endParaRPr lang="en-US"/>
           </a:p>
@@ -928,7 +929,7 @@
           <a:p>
             <a:fld id="{1D8BD707-D9CF-40AE-B4C6-C98DA3205C09}" type="datetimeFigureOut">
               <a:rPr lang="en-US"/>
-              <a:t>1/9/2020</a:t>
+              <a:t>1/10/2020</a:t>
             </a:fld>
             <a:endParaRPr lang="en-US"/>
           </a:p>
@@ -1245,7 +1246,7 @@
           <a:p>
             <a:fld id="{1D8BD707-D9CF-40AE-B4C6-C98DA3205C09}" type="datetimeFigureOut">
               <a:rPr lang="en-US"/>
-              <a:t>1/9/2020</a:t>
+              <a:t>1/10/2020</a:t>
             </a:fld>
             <a:endParaRPr lang="en-US"/>
           </a:p>
@@ -1765,7 +1766,7 @@
         <p:spPr>
           <a:xfrm>
             <a:off x="152401" y="914400"/>
-            <a:ext cx="8763000" cy="4247317"/>
+            <a:ext cx="8763000" cy="5386090"/>
           </a:xfrm>
         </p:spPr>
         <p:txBody>
@@ -1994,150 +1995,288 @@
                 <a:latin typeface="Arial" panose="020B0604020202020204" pitchFamily="34" charset="0"/>
                 <a:cs typeface="Arial" panose="020B0604020202020204" pitchFamily="34" charset="0"/>
               </a:rPr>
-              <a:t>aperiodic</a:t>
-            </a:r>
+              <a:t>Aperiodic</a:t>
+            </a:r>
+          </a:p>
+          <a:p>
             <a:r>
               <a:rPr lang="en-US" sz="1200" dirty="0">
                 <a:latin typeface="Arial" panose="020B0604020202020204" pitchFamily="34" charset="0"/>
                 <a:cs typeface="Arial" panose="020B0604020202020204" pitchFamily="34" charset="0"/>
               </a:rPr>
-              <a:t>:</a:t>
-            </a:r>
-          </a:p>
-          <a:p>
-            <a:endParaRPr lang="en-US" sz="1200" dirty="0">
+              <a:t>where no </a:t>
+            </a:r>
+            <a:r>
+              <a:rPr lang="en-US" sz="1200" i="1" dirty="0">
+                <a:latin typeface="Arial" panose="020B0604020202020204" pitchFamily="34" charset="0"/>
+                <a:cs typeface="Arial" panose="020B0604020202020204" pitchFamily="34" charset="0"/>
+              </a:rPr>
+              <a:t>p</a:t>
+            </a:r>
+            <a:r>
+              <a:rPr lang="en-US" sz="1200" dirty="0">
+                <a:latin typeface="Arial" panose="020B0604020202020204" pitchFamily="34" charset="0"/>
+                <a:cs typeface="Arial" panose="020B0604020202020204" pitchFamily="34" charset="0"/>
+              </a:rPr>
+              <a:t> exist.</a:t>
+            </a:r>
+          </a:p>
+          <a:p>
+            <a:r>
+              <a:rPr lang="en-US" sz="1200" dirty="0"/>
+              <a:t>Period and Frequency of Sin and Cos:</a:t>
+            </a:r>
+          </a:p>
+          <a:p>
+            <a:pPr algn="just"/>
+            <a:r>
+              <a:rPr lang="en-US" sz="1200" b="1" u="sng" dirty="0">
+                <a:latin typeface="Arial" panose="020B0604020202020204" pitchFamily="34" charset="0"/>
+                <a:cs typeface="Arial" panose="020B0604020202020204" pitchFamily="34" charset="0"/>
+              </a:rPr>
+              <a:t>Period</a:t>
+            </a:r>
+            <a:r>
+              <a:rPr lang="en-US" sz="1200" dirty="0">
+                <a:latin typeface="Arial" panose="020B0604020202020204" pitchFamily="34" charset="0"/>
+                <a:cs typeface="Arial" panose="020B0604020202020204" pitchFamily="34" charset="0"/>
+              </a:rPr>
+              <a:t> = 2𝜋/B &amp; </a:t>
+            </a:r>
+            <a:r>
+              <a:rPr lang="en-US" sz="1200" b="1" u="sng" dirty="0">
+                <a:latin typeface="Arial" panose="020B0604020202020204" pitchFamily="34" charset="0"/>
+                <a:cs typeface="Arial" panose="020B0604020202020204" pitchFamily="34" charset="0"/>
+              </a:rPr>
+              <a:t>Frequency</a:t>
+            </a:r>
+            <a:r>
+              <a:rPr lang="en-US" sz="1200" dirty="0">
+                <a:latin typeface="Arial" panose="020B0604020202020204" pitchFamily="34" charset="0"/>
+                <a:cs typeface="Arial" panose="020B0604020202020204" pitchFamily="34" charset="0"/>
+              </a:rPr>
+              <a:t> = B/2𝜋                                             </a:t>
+            </a:r>
+            <a:r>
+              <a:rPr lang="en-US" sz="1200" b="1" u="sng" dirty="0">
+                <a:latin typeface="Arial" panose="020B0604020202020204" pitchFamily="34" charset="0"/>
+                <a:cs typeface="Arial" panose="020B0604020202020204" pitchFamily="34" charset="0"/>
+              </a:rPr>
+              <a:t>The main Idea is </a:t>
+            </a:r>
+            <a:r>
+              <a:rPr lang="en-US" sz="1200" i="1" dirty="0">
+                <a:latin typeface="Arial" panose="020B0604020202020204" pitchFamily="34" charset="0"/>
+                <a:cs typeface="Arial" panose="020B0604020202020204" pitchFamily="34" charset="0"/>
+              </a:rPr>
+              <a:t>that If we can discover the</a:t>
+            </a:r>
+          </a:p>
+          <a:p>
+            <a:pPr algn="just"/>
+            <a:r>
+              <a:rPr lang="en-US" sz="1200" i="1" dirty="0">
+                <a:latin typeface="Arial" panose="020B0604020202020204" pitchFamily="34" charset="0"/>
+                <a:cs typeface="Arial" panose="020B0604020202020204" pitchFamily="34" charset="0"/>
+              </a:rPr>
+              <a:t>                                                                                                      frequency content of a set of data (or lack thereof), then we can                                     </a:t>
+            </a:r>
+          </a:p>
+          <a:p>
+            <a:pPr algn="just"/>
+            <a:r>
+              <a:rPr lang="en-US" sz="1200" i="1" dirty="0">
+                <a:latin typeface="Arial" panose="020B0604020202020204" pitchFamily="34" charset="0"/>
+                <a:cs typeface="Arial" panose="020B0604020202020204" pitchFamily="34" charset="0"/>
+              </a:rPr>
+              <a:t>                                                                                                      better understand the process generating the data.</a:t>
+            </a:r>
+          </a:p>
+          <a:p>
+            <a:pPr algn="just"/>
+            <a:r>
+              <a:rPr lang="en-US" sz="1200" i="1" dirty="0">
+                <a:latin typeface="Arial" panose="020B0604020202020204" pitchFamily="34" charset="0"/>
+                <a:cs typeface="Arial" panose="020B0604020202020204" pitchFamily="34" charset="0"/>
+              </a:rPr>
+              <a:t>                                                  </a:t>
+            </a:r>
+            <a:r>
+              <a:rPr lang="en-US" sz="1200" dirty="0">
+                <a:latin typeface="Arial" panose="020B0604020202020204" pitchFamily="34" charset="0"/>
+                <a:cs typeface="Arial" panose="020B0604020202020204" pitchFamily="34" charset="0"/>
+              </a:rPr>
+              <a:t>We went on to look at the Fourier Series </a:t>
+            </a:r>
+            <a:r>
+              <a:rPr lang="en-US" sz="800" dirty="0">
+                <a:latin typeface="Arial" panose="020B0604020202020204" pitchFamily="34" charset="0"/>
+                <a:cs typeface="Arial" panose="020B0604020202020204" pitchFamily="34" charset="0"/>
+              </a:rPr>
+              <a:t>“Non-cyclic type” functions can be expressed as a linear combination of sines</a:t>
+            </a:r>
+          </a:p>
+          <a:p>
+            <a:pPr algn="just"/>
+            <a:r>
+              <a:rPr lang="en-US" sz="800" dirty="0">
+                <a:latin typeface="Arial" panose="020B0604020202020204" pitchFamily="34" charset="0"/>
+                <a:cs typeface="Arial" panose="020B0604020202020204" pitchFamily="34" charset="0"/>
+              </a:rPr>
+              <a:t>                                                                                                                                                                            and cosines.</a:t>
+            </a:r>
+          </a:p>
+          <a:p>
+            <a:pPr algn="just"/>
+            <a:r>
+              <a:rPr lang="en-US" sz="1200" dirty="0">
+                <a:latin typeface="Arial" panose="020B0604020202020204" pitchFamily="34" charset="0"/>
+                <a:cs typeface="Arial" panose="020B0604020202020204" pitchFamily="34" charset="0"/>
+              </a:rPr>
+              <a:t>                                                  </a:t>
+            </a:r>
+            <a:r>
+              <a:rPr lang="en-US" sz="1200" b="1" dirty="0">
+                <a:latin typeface="Arial" panose="020B0604020202020204" pitchFamily="34" charset="0"/>
+                <a:cs typeface="Arial" panose="020B0604020202020204" pitchFamily="34" charset="0"/>
+              </a:rPr>
+              <a:t>Spectral Analysis </a:t>
+            </a:r>
+            <a:r>
+              <a:rPr lang="en-US" sz="1200" dirty="0">
+                <a:latin typeface="Arial" panose="020B0604020202020204" pitchFamily="34" charset="0"/>
+                <a:cs typeface="Arial" panose="020B0604020202020204" pitchFamily="34" charset="0"/>
+              </a:rPr>
+              <a:t>- The decomposition of functions (usually depending on time) into a sum of</a:t>
+            </a:r>
+          </a:p>
+          <a:p>
+            <a:pPr algn="just"/>
+            <a:r>
+              <a:rPr lang="en-US" sz="1200" dirty="0">
+                <a:latin typeface="Arial" panose="020B0604020202020204" pitchFamily="34" charset="0"/>
+                <a:cs typeface="Arial" panose="020B0604020202020204" pitchFamily="34" charset="0"/>
+              </a:rPr>
+              <a:t>                                                    sine and cosine terms.</a:t>
+            </a:r>
+          </a:p>
+          <a:p>
+            <a:r>
+              <a:rPr lang="en-US" sz="1200" dirty="0">
+                <a:latin typeface="Arial" panose="020B0604020202020204" pitchFamily="34" charset="0"/>
+                <a:cs typeface="Arial" panose="020B0604020202020204" pitchFamily="34" charset="0"/>
+              </a:rPr>
+              <a:t>                                                  </a:t>
+            </a:r>
+            <a:r>
+              <a:rPr lang="en-US" sz="1200" b="1" dirty="0">
+                <a:latin typeface="Arial" panose="020B0604020202020204" pitchFamily="34" charset="0"/>
+                <a:cs typeface="Arial" panose="020B0604020202020204" pitchFamily="34" charset="0"/>
+              </a:rPr>
+              <a:t>Spectral Density - </a:t>
+            </a:r>
+            <a:r>
+              <a:rPr lang="en-US" sz="1200" dirty="0"/>
+              <a:t>tool to identify the frequency content of a time series (if you know the AC (</a:t>
+            </a:r>
+            <a:r>
+              <a:rPr lang="en-US" sz="1200" b="1" dirty="0">
+                <a:latin typeface="CambriaMath"/>
+              </a:rPr>
+              <a:t>𝜌</a:t>
+            </a:r>
+            <a:r>
+              <a:rPr lang="en-US" sz="1050" b="1" dirty="0">
+                <a:latin typeface="CambriaMath"/>
+              </a:rPr>
+              <a:t>k</a:t>
+            </a:r>
+            <a:r>
+              <a:rPr lang="en-US" sz="1050" dirty="0">
+                <a:latin typeface="CambriaMath"/>
+              </a:rPr>
+              <a:t>)</a:t>
+            </a:r>
+            <a:r>
+              <a:rPr lang="en-US" sz="1200" dirty="0"/>
+              <a:t> you can calculate the </a:t>
+            </a:r>
+            <a:r>
+              <a:rPr lang="en-US" sz="1200" dirty="0">
+                <a:latin typeface="ArialMT"/>
+              </a:rPr>
+              <a:t>spectral density </a:t>
+            </a:r>
+            <a:r>
+              <a:rPr lang="en-US" sz="1200" b="1" i="1" dirty="0">
+                <a:latin typeface="Arial-ItalicMT"/>
+              </a:rPr>
+              <a:t>S(f)</a:t>
+            </a:r>
+            <a:r>
+              <a:rPr lang="en-US" sz="1200" dirty="0">
+                <a:latin typeface="ArialMT"/>
+              </a:rPr>
+              <a:t> and vice versa. These are called Fourier transform pairs.</a:t>
+            </a:r>
+          </a:p>
+          <a:p>
+            <a:r>
+              <a:rPr lang="en-US" dirty="0"/>
+              <a:t>Example: </a:t>
+            </a:r>
+            <a:r>
+              <a:rPr lang="en-US" sz="1200" dirty="0" err="1"/>
+              <a:t>Pseudoperiod</a:t>
+            </a:r>
+            <a:r>
+              <a:rPr lang="en-US" sz="1200" dirty="0"/>
+              <a:t> = 12 </a:t>
+            </a:r>
+            <a:r>
+              <a:rPr lang="en-US" sz="1200" dirty="0" err="1"/>
+              <a:t>months</a:t>
+            </a:r>
+            <a:r>
+              <a:rPr lang="en-US" dirty="0" err="1"/>
+              <a:t>Peak</a:t>
+            </a:r>
+            <a:r>
+              <a:rPr lang="en-US" dirty="0"/>
+              <a:t> in the spectral                                               </a:t>
+            </a:r>
+            <a:r>
+              <a:rPr lang="en-US" sz="1200" dirty="0"/>
+              <a:t>Peek in the S. density at .083</a:t>
+            </a:r>
+          </a:p>
+          <a:p>
+            <a:r>
+              <a:rPr lang="en-US" sz="1200" dirty="0"/>
+              <a:t>                  Frequency = .0833                                                                                                       </a:t>
+            </a:r>
+            <a:r>
+              <a:rPr lang="en-US" sz="1000" dirty="0"/>
+              <a:t>The </a:t>
+            </a:r>
+            <a:r>
+              <a:rPr lang="en-US" sz="1000" dirty="0" err="1"/>
+              <a:t>Parzen</a:t>
+            </a:r>
+            <a:r>
+              <a:rPr lang="en-US" sz="1000" dirty="0"/>
+              <a:t> window –</a:t>
+            </a:r>
+          </a:p>
+          <a:p>
+            <a:r>
+              <a:rPr lang="en-US" sz="1000" dirty="0"/>
+              <a:t>                                                                                                                                                                                             Smoothed Spectral Estimates</a:t>
+            </a:r>
+            <a:endParaRPr lang="en-US" sz="1000" b="1" dirty="0">
               <a:latin typeface="Arial" panose="020B0604020202020204" pitchFamily="34" charset="0"/>
               <a:cs typeface="Arial" panose="020B0604020202020204" pitchFamily="34" charset="0"/>
             </a:endParaRPr>
-          </a:p>
-          <a:p>
-            <a:r>
-              <a:rPr lang="en-US" sz="1200" dirty="0"/>
-              <a:t>Period and Frequency of Sin and Cos:</a:t>
-            </a:r>
-          </a:p>
-          <a:p>
-            <a:pPr algn="just"/>
-            <a:r>
-              <a:rPr lang="en-US" sz="1200" b="1" u="sng" dirty="0">
-                <a:latin typeface="Arial" panose="020B0604020202020204" pitchFamily="34" charset="0"/>
-                <a:cs typeface="Arial" panose="020B0604020202020204" pitchFamily="34" charset="0"/>
-              </a:rPr>
-              <a:t>Period</a:t>
-            </a:r>
-            <a:r>
-              <a:rPr lang="en-US" sz="1200" dirty="0">
-                <a:latin typeface="Arial" panose="020B0604020202020204" pitchFamily="34" charset="0"/>
-                <a:cs typeface="Arial" panose="020B0604020202020204" pitchFamily="34" charset="0"/>
-              </a:rPr>
-              <a:t> = 2𝜋/B &amp; </a:t>
-            </a:r>
-            <a:r>
-              <a:rPr lang="en-US" sz="1200" b="1" u="sng" dirty="0">
-                <a:latin typeface="Arial" panose="020B0604020202020204" pitchFamily="34" charset="0"/>
-                <a:cs typeface="Arial" panose="020B0604020202020204" pitchFamily="34" charset="0"/>
-              </a:rPr>
-              <a:t>Frequency</a:t>
-            </a:r>
-            <a:r>
-              <a:rPr lang="en-US" sz="1200" dirty="0">
-                <a:latin typeface="Arial" panose="020B0604020202020204" pitchFamily="34" charset="0"/>
-                <a:cs typeface="Arial" panose="020B0604020202020204" pitchFamily="34" charset="0"/>
-              </a:rPr>
-              <a:t> = B/2𝜋                                             </a:t>
-            </a:r>
-            <a:r>
-              <a:rPr lang="en-US" sz="1200" b="1" u="sng" dirty="0">
-                <a:latin typeface="Arial" panose="020B0604020202020204" pitchFamily="34" charset="0"/>
-                <a:cs typeface="Arial" panose="020B0604020202020204" pitchFamily="34" charset="0"/>
-              </a:rPr>
-              <a:t>The main Idea is </a:t>
-            </a:r>
-            <a:r>
-              <a:rPr lang="en-US" sz="1200" i="1" dirty="0">
-                <a:latin typeface="Arial" panose="020B0604020202020204" pitchFamily="34" charset="0"/>
-                <a:cs typeface="Arial" panose="020B0604020202020204" pitchFamily="34" charset="0"/>
-              </a:rPr>
-              <a:t>that If we can discover the</a:t>
-            </a:r>
-          </a:p>
-          <a:p>
-            <a:pPr algn="just"/>
-            <a:r>
-              <a:rPr lang="en-US" sz="1200" i="1" dirty="0">
-                <a:latin typeface="Arial" panose="020B0604020202020204" pitchFamily="34" charset="0"/>
-                <a:cs typeface="Arial" panose="020B0604020202020204" pitchFamily="34" charset="0"/>
-              </a:rPr>
-              <a:t>                                                                                                      frequency content of a set of data (or lack thereof), then we can                                     </a:t>
-            </a:r>
-          </a:p>
-          <a:p>
-            <a:pPr algn="just"/>
-            <a:r>
-              <a:rPr lang="en-US" sz="1200" i="1" dirty="0">
-                <a:latin typeface="Arial" panose="020B0604020202020204" pitchFamily="34" charset="0"/>
-                <a:cs typeface="Arial" panose="020B0604020202020204" pitchFamily="34" charset="0"/>
-              </a:rPr>
-              <a:t>                                                                                                      better understand the process generating the data.</a:t>
-            </a:r>
-          </a:p>
-          <a:p>
-            <a:pPr algn="just"/>
-            <a:r>
-              <a:rPr lang="en-US" sz="1200" i="1" dirty="0">
-                <a:latin typeface="Arial" panose="020B0604020202020204" pitchFamily="34" charset="0"/>
-                <a:cs typeface="Arial" panose="020B0604020202020204" pitchFamily="34" charset="0"/>
-              </a:rPr>
-              <a:t>                                                  </a:t>
-            </a:r>
-            <a:r>
-              <a:rPr lang="en-US" sz="1200" dirty="0">
-                <a:latin typeface="Arial" panose="020B0604020202020204" pitchFamily="34" charset="0"/>
-                <a:cs typeface="Arial" panose="020B0604020202020204" pitchFamily="34" charset="0"/>
-              </a:rPr>
-              <a:t>We went on to look at </a:t>
-            </a:r>
-            <a:r>
-              <a:rPr lang="en-US" sz="1200">
-                <a:latin typeface="Arial" panose="020B0604020202020204" pitchFamily="34" charset="0"/>
-                <a:cs typeface="Arial" panose="020B0604020202020204" pitchFamily="34" charset="0"/>
-              </a:rPr>
-              <a:t>the Fourier Series</a:t>
-            </a:r>
-          </a:p>
-          <a:p>
-            <a:pPr algn="just"/>
-            <a:r>
-              <a:rPr lang="en-US" sz="1200">
-                <a:latin typeface="Arial" panose="020B0604020202020204" pitchFamily="34" charset="0"/>
-                <a:cs typeface="Arial" panose="020B0604020202020204" pitchFamily="34" charset="0"/>
-              </a:rPr>
-              <a:t>                                                  </a:t>
-            </a:r>
-            <a:r>
-              <a:rPr lang="en-US" sz="1200" b="1" dirty="0">
-                <a:latin typeface="Arial" panose="020B0604020202020204" pitchFamily="34" charset="0"/>
-                <a:cs typeface="Arial" panose="020B0604020202020204" pitchFamily="34" charset="0"/>
-              </a:rPr>
-              <a:t>Spectral Analysis </a:t>
-            </a:r>
-            <a:r>
-              <a:rPr lang="en-US" sz="1200" dirty="0">
-                <a:latin typeface="Arial" panose="020B0604020202020204" pitchFamily="34" charset="0"/>
-                <a:cs typeface="Arial" panose="020B0604020202020204" pitchFamily="34" charset="0"/>
-              </a:rPr>
-              <a:t>- The decomposition of functions (usually depending on time) into a sum of</a:t>
-            </a:r>
-          </a:p>
-          <a:p>
-            <a:pPr algn="just"/>
-            <a:r>
-              <a:rPr lang="en-US" sz="1200" dirty="0">
-                <a:latin typeface="Arial" panose="020B0604020202020204" pitchFamily="34" charset="0"/>
-                <a:cs typeface="Arial" panose="020B0604020202020204" pitchFamily="34" charset="0"/>
-              </a:rPr>
-              <a:t>                                                    sine and cosine terms</a:t>
-            </a:r>
           </a:p>
         </p:txBody>
       </p:sp>
@@ -2228,8 +2367,8 @@
         </p:blipFill>
         <p:spPr>
           <a:xfrm>
-            <a:off x="3886200" y="1193251"/>
-            <a:ext cx="2100126" cy="1306084"/>
+            <a:off x="3886201" y="1193252"/>
+            <a:ext cx="1905000" cy="1184734"/>
           </a:xfrm>
           <a:prstGeom prst="rect">
             <a:avLst/>
@@ -2296,6 +2435,66 @@
           </a:prstGeom>
         </p:spPr>
       </p:pic>
+      <p:pic>
+        <p:nvPicPr>
+          <p:cNvPr id="5" name="Picture 4">
+            <a:extLst>
+              <a:ext uri="{FF2B5EF4-FFF2-40B4-BE49-F238E27FC236}">
+                <a16:creationId xmlns:a16="http://schemas.microsoft.com/office/drawing/2014/main" id="{762EC67D-9B1E-46ED-BB9D-699A687B1AF5}"/>
+              </a:ext>
+            </a:extLst>
+          </p:cNvPr>
+          <p:cNvPicPr>
+            <a:picLocks noChangeAspect="1"/>
+          </p:cNvPicPr>
+          <p:nvPr/>
+        </p:nvPicPr>
+        <p:blipFill>
+          <a:blip r:embed="rId9"/>
+          <a:stretch>
+            <a:fillRect/>
+          </a:stretch>
+        </p:blipFill>
+        <p:spPr>
+          <a:xfrm>
+            <a:off x="2764554" y="5625213"/>
+            <a:ext cx="1765301" cy="919666"/>
+          </a:xfrm>
+          <a:prstGeom prst="rect">
+            <a:avLst/>
+          </a:prstGeom>
+        </p:spPr>
+      </p:pic>
+      <p:pic>
+        <p:nvPicPr>
+          <p:cNvPr id="6" name="Picture 5">
+            <a:extLst>
+              <a:ext uri="{FF2B5EF4-FFF2-40B4-BE49-F238E27FC236}">
+                <a16:creationId xmlns:a16="http://schemas.microsoft.com/office/drawing/2014/main" id="{6D2F5D70-41CB-4EE8-A766-583D4BD03E7C}"/>
+              </a:ext>
+            </a:extLst>
+          </p:cNvPr>
+          <p:cNvPicPr>
+            <a:picLocks noChangeAspect="1"/>
+          </p:cNvPicPr>
+          <p:nvPr/>
+        </p:nvPicPr>
+        <p:blipFill>
+          <a:blip r:embed="rId10"/>
+          <a:stretch>
+            <a:fillRect/>
+          </a:stretch>
+        </p:blipFill>
+        <p:spPr>
+          <a:xfrm>
+            <a:off x="4571999" y="5625867"/>
+            <a:ext cx="2057401" cy="1071840"/>
+          </a:xfrm>
+          <a:prstGeom prst="rect">
+            <a:avLst/>
+          </a:prstGeom>
+        </p:spPr>
+      </p:pic>
     </p:spTree>
     <p:extLst>
       <p:ext uri="{BB962C8B-B14F-4D97-AF65-F5344CB8AC3E}">
@@ -2310,6 +2509,168 @@
 </file>
 
 <file path=ppt/slides/slide3.xml><?xml version="1.0" encoding="utf-8"?>
+<p:sld xmlns:a="http://schemas.openxmlformats.org/drawingml/2006/main" xmlns:r="http://schemas.openxmlformats.org/officeDocument/2006/relationships" xmlns:p="http://schemas.openxmlformats.org/presentationml/2006/main">
+  <p:cSld>
+    <p:spTree>
+      <p:nvGrpSpPr>
+        <p:cNvPr id="1" name=""/>
+        <p:cNvGrpSpPr/>
+        <p:nvPr/>
+      </p:nvGrpSpPr>
+      <p:grpSpPr>
+        <a:xfrm>
+          <a:off x="0" y="0"/>
+          <a:ext cx="0" cy="0"/>
+          <a:chOff x="0" y="0"/>
+          <a:chExt cx="0" cy="0"/>
+        </a:xfrm>
+      </p:grpSpPr>
+      <p:sp>
+        <p:nvSpPr>
+          <p:cNvPr id="2" name="Title 1">
+            <a:extLst>
+              <a:ext uri="{FF2B5EF4-FFF2-40B4-BE49-F238E27FC236}">
+                <a16:creationId xmlns:a16="http://schemas.microsoft.com/office/drawing/2014/main" id="{3EB5D0D5-202E-4347-90F7-CDB7294404EA}"/>
+              </a:ext>
+            </a:extLst>
+          </p:cNvPr>
+          <p:cNvSpPr>
+            <a:spLocks noGrp="1"/>
+          </p:cNvSpPr>
+          <p:nvPr>
+            <p:ph type="title"/>
+          </p:nvPr>
+        </p:nvSpPr>
+        <p:spPr>
+          <a:xfrm>
+            <a:off x="565435" y="439420"/>
+            <a:ext cx="8013129" cy="369332"/>
+          </a:xfrm>
+        </p:spPr>
+        <p:txBody>
+          <a:bodyPr/>
+          <a:lstStyle/>
+          <a:p>
+            <a:r>
+              <a:rPr lang="en-US" sz="2400" dirty="0"/>
+              <a:t>Questions on information – Week 2</a:t>
+            </a:r>
+          </a:p>
+        </p:txBody>
+      </p:sp>
+      <p:sp>
+        <p:nvSpPr>
+          <p:cNvPr id="3" name="Text Placeholder 2">
+            <a:extLst>
+              <a:ext uri="{FF2B5EF4-FFF2-40B4-BE49-F238E27FC236}">
+                <a16:creationId xmlns:a16="http://schemas.microsoft.com/office/drawing/2014/main" id="{7DCE388E-BD61-4C14-9B75-81B7614F121E}"/>
+              </a:ext>
+            </a:extLst>
+          </p:cNvPr>
+          <p:cNvSpPr>
+            <a:spLocks noGrp="1"/>
+          </p:cNvSpPr>
+          <p:nvPr>
+            <p:ph type="body" idx="1"/>
+          </p:nvPr>
+        </p:nvSpPr>
+        <p:spPr>
+          <a:xfrm>
+            <a:off x="152401" y="914400"/>
+            <a:ext cx="8763000" cy="153888"/>
+          </a:xfrm>
+        </p:spPr>
+        <p:txBody>
+          <a:bodyPr/>
+          <a:lstStyle/>
+          <a:p>
+            <a:r>
+              <a:rPr lang="en-US" sz="1000" b="1" dirty="0">
+                <a:latin typeface="Arial" panose="020B0604020202020204" pitchFamily="34" charset="0"/>
+                <a:cs typeface="Arial" panose="020B0604020202020204" pitchFamily="34" charset="0"/>
+              </a:rPr>
+              <a:t>I am having a tough time grasping lam</a:t>
+            </a:r>
+          </a:p>
+        </p:txBody>
+      </p:sp>
+      <p:sp>
+        <p:nvSpPr>
+          <p:cNvPr id="4" name="object 3">
+            <a:extLst>
+              <a:ext uri="{FF2B5EF4-FFF2-40B4-BE49-F238E27FC236}">
+                <a16:creationId xmlns:a16="http://schemas.microsoft.com/office/drawing/2014/main" id="{966817AA-55C2-44C8-89CD-AAB0CE1FDA9B}"/>
+              </a:ext>
+            </a:extLst>
+          </p:cNvPr>
+          <p:cNvSpPr/>
+          <p:nvPr/>
+        </p:nvSpPr>
+        <p:spPr>
+          <a:xfrm>
+            <a:off x="304800" y="6400800"/>
+            <a:ext cx="1765300" cy="152400"/>
+          </a:xfrm>
+          <a:prstGeom prst="rect">
+            <a:avLst/>
+          </a:prstGeom>
+          <a:blipFill>
+            <a:blip r:embed="rId2" cstate="print"/>
+            <a:stretch>
+              <a:fillRect/>
+            </a:stretch>
+          </a:blipFill>
+        </p:spPr>
+        <p:txBody>
+          <a:bodyPr wrap="square" lIns="0" tIns="0" rIns="0" bIns="0" rtlCol="0"/>
+          <a:lstStyle/>
+          <a:p>
+            <a:endParaRPr/>
+          </a:p>
+        </p:txBody>
+      </p:sp>
+      <p:pic>
+        <p:nvPicPr>
+          <p:cNvPr id="17" name="Picture 16">
+            <a:extLst>
+              <a:ext uri="{FF2B5EF4-FFF2-40B4-BE49-F238E27FC236}">
+                <a16:creationId xmlns:a16="http://schemas.microsoft.com/office/drawing/2014/main" id="{D25B22B5-3CAF-4D75-BF5E-4FD896ACA89A}"/>
+              </a:ext>
+            </a:extLst>
+          </p:cNvPr>
+          <p:cNvPicPr/>
+          <p:nvPr/>
+        </p:nvPicPr>
+        <p:blipFill>
+          <a:blip r:embed="rId3"/>
+          <a:stretch>
+            <a:fillRect/>
+          </a:stretch>
+        </p:blipFill>
+        <p:spPr>
+          <a:xfrm>
+            <a:off x="2314575" y="1916430"/>
+            <a:ext cx="4514850" cy="3025140"/>
+          </a:xfrm>
+          <a:prstGeom prst="rect">
+            <a:avLst/>
+          </a:prstGeom>
+        </p:spPr>
+      </p:pic>
+    </p:spTree>
+    <p:extLst>
+      <p:ext uri="{BB962C8B-B14F-4D97-AF65-F5344CB8AC3E}">
+        <p14:creationId xmlns:p14="http://schemas.microsoft.com/office/powerpoint/2010/main" val="3482260428"/>
+      </p:ext>
+    </p:extLst>
+  </p:cSld>
+  <p:clrMapOvr>
+    <a:masterClrMapping/>
+  </p:clrMapOvr>
+</p:sld>
+</file>
+
+<file path=ppt/slides/slide4.xml><?xml version="1.0" encoding="utf-8"?>
 <p:sld xmlns:a="http://schemas.openxmlformats.org/drawingml/2006/main" xmlns:r="http://schemas.openxmlformats.org/officeDocument/2006/relationships" xmlns:p="http://schemas.openxmlformats.org/presentationml/2006/main">
   <p:cSld>
     <p:spTree>

</xml_diff>

<commit_message>
PP unit 2 updates
</commit_message>
<xml_diff>
--- a/Unit02/Chad_Madding_Unit 2 For Live Session.pptx
+++ b/Unit02/Chad_Madding_Unit 2 For Live Session.pptx
@@ -271,7 +271,7 @@
           <a:p>
             <a:fld id="{1D8BD707-D9CF-40AE-B4C6-C98DA3205C09}" type="datetimeFigureOut">
               <a:rPr lang="en-US"/>
-              <a:t>1/10/2020</a:t>
+              <a:t>1/11/2020</a:t>
             </a:fld>
             <a:endParaRPr lang="en-US"/>
           </a:p>
@@ -448,7 +448,7 @@
           <a:p>
             <a:fld id="{1D8BD707-D9CF-40AE-B4C6-C98DA3205C09}" type="datetimeFigureOut">
               <a:rPr lang="en-US"/>
-              <a:t>1/10/2020</a:t>
+              <a:t>1/11/2020</a:t>
             </a:fld>
             <a:endParaRPr lang="en-US"/>
           </a:p>
@@ -662,7 +662,7 @@
           <a:p>
             <a:fld id="{1D8BD707-D9CF-40AE-B4C6-C98DA3205C09}" type="datetimeFigureOut">
               <a:rPr lang="en-US"/>
-              <a:t>1/10/2020</a:t>
+              <a:t>1/11/2020</a:t>
             </a:fld>
             <a:endParaRPr lang="en-US"/>
           </a:p>
@@ -810,7 +810,7 @@
           <a:p>
             <a:fld id="{1D8BD707-D9CF-40AE-B4C6-C98DA3205C09}" type="datetimeFigureOut">
               <a:rPr lang="en-US"/>
-              <a:t>1/10/2020</a:t>
+              <a:t>1/11/2020</a:t>
             </a:fld>
             <a:endParaRPr lang="en-US"/>
           </a:p>
@@ -929,7 +929,7 @@
           <a:p>
             <a:fld id="{1D8BD707-D9CF-40AE-B4C6-C98DA3205C09}" type="datetimeFigureOut">
               <a:rPr lang="en-US"/>
-              <a:t>1/10/2020</a:t>
+              <a:t>1/11/2020</a:t>
             </a:fld>
             <a:endParaRPr lang="en-US"/>
           </a:p>
@@ -1246,7 +1246,7 @@
           <a:p>
             <a:fld id="{1D8BD707-D9CF-40AE-B4C6-C98DA3205C09}" type="datetimeFigureOut">
               <a:rPr lang="en-US"/>
-              <a:t>1/10/2020</a:t>
+              <a:t>1/11/2020</a:t>
             </a:fld>
             <a:endParaRPr lang="en-US"/>
           </a:p>
@@ -2231,15 +2231,11 @@
             </a:r>
             <a:r>
               <a:rPr lang="en-US" sz="1200" dirty="0"/>
-              <a:t> = 12 </a:t>
-            </a:r>
-            <a:r>
-              <a:rPr lang="en-US" sz="1200" dirty="0" err="1"/>
-              <a:t>months</a:t>
+              <a:t> = 12 months   </a:t>
             </a:r>
             <a:r>
               <a:rPr lang="en-US" dirty="0" err="1"/>
-              <a:t>Peak</a:t>
+              <a:t>eak</a:t>
             </a:r>
             <a:r>
               <a:rPr lang="en-US" dirty="0"/>
@@ -2577,7 +2573,7 @@
         <p:spPr>
           <a:xfrm>
             <a:off x="152401" y="914400"/>
-            <a:ext cx="8763000" cy="153888"/>
+            <a:ext cx="8763000" cy="1077218"/>
           </a:xfrm>
         </p:spPr>
         <p:txBody>
@@ -2585,11 +2581,62 @@
           <a:lstStyle/>
           <a:p>
             <a:r>
-              <a:rPr lang="en-US" sz="1000" b="1" dirty="0">
-                <a:latin typeface="Arial" panose="020B0604020202020204" pitchFamily="34" charset="0"/>
-                <a:cs typeface="Arial" panose="020B0604020202020204" pitchFamily="34" charset="0"/>
-              </a:rPr>
-              <a:t>I am having a tough time grasping lam</a:t>
+              <a:rPr lang="en-US" sz="1000" dirty="0">
+                <a:latin typeface="Arial" panose="020B0604020202020204" pitchFamily="34" charset="0"/>
+                <a:cs typeface="Arial" panose="020B0604020202020204" pitchFamily="34" charset="0"/>
+              </a:rPr>
+              <a:t>I am having a tough time grasping lambda hat.</a:t>
+            </a:r>
+          </a:p>
+          <a:p>
+            <a:r>
+              <a:rPr lang="en-US" sz="1000" dirty="0">
+                <a:latin typeface="Arial" panose="020B0604020202020204" pitchFamily="34" charset="0"/>
+                <a:cs typeface="Arial" panose="020B0604020202020204" pitchFamily="34" charset="0"/>
+              </a:rPr>
+              <a:t>I have done the excel work and kind of get the math but I am needing to see how lambda works visually and in the bigger since of time series.</a:t>
+            </a:r>
+          </a:p>
+          <a:p>
+            <a:r>
+              <a:rPr lang="en-US" sz="1000" dirty="0">
+                <a:latin typeface="Arial" panose="020B0604020202020204" pitchFamily="34" charset="0"/>
+                <a:cs typeface="Arial" panose="020B0604020202020204" pitchFamily="34" charset="0"/>
+              </a:rPr>
+              <a:t>What is a simple definition of lambda in the below solution.</a:t>
+            </a:r>
+          </a:p>
+          <a:p>
+            <a:r>
+              <a:rPr lang="en-US" sz="1000" dirty="0">
+                <a:latin typeface="Arial" panose="020B0604020202020204" pitchFamily="34" charset="0"/>
+                <a:cs typeface="Arial" panose="020B0604020202020204" pitchFamily="34" charset="0"/>
+              </a:rPr>
+              <a:t>I got all the right answers but for me I need to see how all the parts work before the concept will stick.</a:t>
+            </a:r>
+          </a:p>
+          <a:p>
+            <a:endParaRPr lang="en-US" sz="1000" dirty="0">
+              <a:latin typeface="Arial" panose="020B0604020202020204" pitchFamily="34" charset="0"/>
+              <a:cs typeface="Arial" panose="020B0604020202020204" pitchFamily="34" charset="0"/>
+            </a:endParaRPr>
+          </a:p>
+          <a:p>
+            <a:r>
+              <a:rPr lang="en-US" sz="1000" dirty="0">
+                <a:latin typeface="Arial" panose="020B0604020202020204" pitchFamily="34" charset="0"/>
+                <a:cs typeface="Arial" panose="020B0604020202020204" pitchFamily="34" charset="0"/>
+              </a:rPr>
+              <a:t>Thanks for taking the time,</a:t>
+            </a:r>
+          </a:p>
+          <a:p>
+            <a:r>
+              <a:rPr lang="en-US" sz="1000" dirty="0">
+                <a:latin typeface="Arial" panose="020B0604020202020204" pitchFamily="34" charset="0"/>
+                <a:cs typeface="Arial" panose="020B0604020202020204" pitchFamily="34" charset="0"/>
+              </a:rPr>
+              <a:t>Chad</a:t>
             </a:r>
           </a:p>
         </p:txBody>
@@ -2649,7 +2696,7 @@
         </p:blipFill>
         <p:spPr>
           <a:xfrm>
-            <a:off x="2314575" y="1916430"/>
+            <a:off x="1676400" y="1808549"/>
             <a:ext cx="4514850" cy="3025140"/>
           </a:xfrm>
           <a:prstGeom prst="rect">

</xml_diff>